<commit_message>
Minor changes to VerifiedGC figure
</commit_message>
<xml_diff>
--- a/VerifiedGC.pptx
+++ b/VerifiedGC.pptx
@@ -4847,8 +4847,21 @@
                   <a:schemeClr val="accent1"/>
                 </a:solidFill>
               </a:rPr>
-              <a:t>phase 5</a:t>
-            </a:r>
+              <a:t>phase </a:t>
+            </a:r>
+            <a:r>
+              <a:rPr lang="en-US" b="1" dirty="0" smtClean="0">
+                <a:solidFill>
+                  <a:schemeClr val="accent1"/>
+                </a:solidFill>
+              </a:rPr>
+              <a:t>6</a:t>
+            </a:r>
+            <a:endParaRPr lang="en-US" b="1" dirty="0">
+              <a:solidFill>
+                <a:schemeClr val="accent1"/>
+              </a:solidFill>
+            </a:endParaRPr>
           </a:p>
           <a:p>
             <a:pPr algn="ctr"/>
@@ -5095,8 +5108,21 @@
                   <a:schemeClr val="accent1"/>
                 </a:solidFill>
               </a:rPr>
-              <a:t>phase 5</a:t>
-            </a:r>
+              <a:t>phase </a:t>
+            </a:r>
+            <a:r>
+              <a:rPr lang="en-US" b="1" dirty="0" smtClean="0">
+                <a:solidFill>
+                  <a:schemeClr val="accent1"/>
+                </a:solidFill>
+              </a:rPr>
+              <a:t>6</a:t>
+            </a:r>
+            <a:endParaRPr lang="en-US" b="1" dirty="0">
+              <a:solidFill>
+                <a:schemeClr val="accent1"/>
+              </a:solidFill>
+            </a:endParaRPr>
           </a:p>
           <a:p>
             <a:pPr algn="ctr"/>
@@ -5836,7 +5862,11 @@
           <a:p>
             <a:r>
               <a:rPr lang="en-US" sz="800" dirty="0"/>
-              <a:t>    &amp;&amp; </a:t>
+              <a:t>    </a:t>
+            </a:r>
+            <a:r>
+              <a:rPr lang="en-US" sz="800" dirty="0" smtClean="0"/>
+              <a:t> &amp;&amp; </a:t>
             </a:r>
             <a:r>
               <a:rPr lang="en-US" sz="800" dirty="0" err="1"/>
@@ -5866,7 +5896,15 @@
           <a:p>
             <a:r>
               <a:rPr lang="en-US" sz="800" dirty="0"/>
-              <a:t>    &amp;&amp; </a:t>
+              <a:t>   </a:t>
+            </a:r>
+            <a:r>
+              <a:rPr lang="en-US" sz="800" dirty="0" smtClean="0"/>
+              <a:t>  </a:t>
+            </a:r>
+            <a:r>
+              <a:rPr lang="en-US" sz="800" dirty="0"/>
+              <a:t>&amp;&amp; </a:t>
             </a:r>
             <a:r>
               <a:rPr lang="en-US" sz="800" dirty="0" err="1"/>
@@ -5896,7 +5934,11 @@
           <a:p>
             <a:r>
               <a:rPr lang="en-US" sz="800" dirty="0"/>
-              <a:t>    &amp;&amp; </a:t>
+              <a:t>    </a:t>
+            </a:r>
+            <a:r>
+              <a:rPr lang="en-US" sz="800" dirty="0" smtClean="0"/>
+              <a:t> &amp;&amp; </a:t>
             </a:r>
             <a:r>
               <a:rPr lang="en-US" sz="800" dirty="0" err="1"/>
@@ -5910,7 +5952,11 @@
           <a:p>
             <a:r>
               <a:rPr lang="en-US" sz="800" dirty="0"/>
-              <a:t>    &amp;&amp; </a:t>
+              <a:t>    </a:t>
+            </a:r>
+            <a:r>
+              <a:rPr lang="en-US" sz="800" dirty="0" smtClean="0"/>
+              <a:t> &amp;&amp; </a:t>
             </a:r>
             <a:r>
               <a:rPr lang="en-US" sz="800" dirty="0" err="1"/>
@@ -5923,8 +5969,12 @@
           </a:p>
           <a:p>
             <a:r>
-              <a:rPr lang="en-US" sz="800" dirty="0"/>
-              <a:t>    &amp;&amp; </a:t>
+              <a:rPr lang="en-US" sz="800" dirty="0" smtClean="0"/>
+              <a:t>     </a:t>
+            </a:r>
+            <a:r>
+              <a:rPr lang="en-US" sz="800" dirty="0"/>
+              <a:t>&amp;&amp; </a:t>
             </a:r>
             <a:r>
               <a:rPr lang="en-US" sz="800" dirty="0" err="1"/>
@@ -5984,9 +6034,9 @@
           <p:nvPr/>
         </p:nvCxnSpPr>
         <p:spPr>
-          <a:xfrm>
-            <a:off x="302967" y="3585280"/>
-            <a:ext cx="59368" cy="293875"/>
+          <a:xfrm flipH="1">
+            <a:off x="2085449" y="2863672"/>
+            <a:ext cx="80112" cy="1012292"/>
           </a:xfrm>
           <a:prstGeom prst="straightConnector1">
             <a:avLst/>
@@ -6019,7 +6069,7 @@
         <p:spPr>
           <a:xfrm>
             <a:off x="4545427" y="3804299"/>
-            <a:ext cx="1773562" cy="954107"/>
+            <a:ext cx="1796004" cy="954107"/>
           </a:xfrm>
           <a:prstGeom prst="rect">
             <a:avLst/>
@@ -6072,7 +6122,15 @@
           <a:p>
             <a:r>
               <a:rPr lang="en-US" sz="800" dirty="0"/>
-              <a:t>    &amp;&amp; </a:t>
+              <a:t>  </a:t>
+            </a:r>
+            <a:r>
+              <a:rPr lang="en-US" sz="800" dirty="0" smtClean="0"/>
+              <a:t>   </a:t>
+            </a:r>
+            <a:r>
+              <a:rPr lang="en-US" sz="800" dirty="0"/>
+              <a:t>&amp;&amp; </a:t>
             </a:r>
             <a:r>
               <a:rPr lang="en-US" sz="800" dirty="0" err="1"/>
@@ -6102,27 +6160,55 @@
           <a:p>
             <a:r>
               <a:rPr lang="en-US" sz="800" dirty="0"/>
-              <a:t>if (   </a:t>
-            </a:r>
-            <a:r>
-              <a:rPr lang="en-US" sz="800" dirty="0" err="1"/>
+              <a:t>if </a:t>
+            </a:r>
+            <a:r>
+              <a:rPr lang="en-US" sz="800"/>
+              <a:t>(   </a:t>
+            </a:r>
+            <a:r>
+              <a:rPr lang="en-US" sz="800" smtClean="0"/>
+              <a:t>     </a:t>
+            </a:r>
+            <a:r>
+              <a:rPr lang="en-US" sz="800" dirty="0" err="1" smtClean="0"/>
               <a:t>memAddr</a:t>
             </a:r>
             <a:r>
-              <a:rPr lang="en-US" sz="800" dirty="0"/>
-              <a:t>(root[y])</a:t>
-            </a:r>
-          </a:p>
-          <a:p>
-            <a:r>
-              <a:rPr lang="en-US" sz="800" dirty="0"/>
-              <a:t>    &amp;&amp; White(Color[root[y]])</a:t>
-            </a:r>
-          </a:p>
-          <a:p>
-            <a:r>
-              <a:rPr lang="en-US" sz="800" dirty="0"/>
-              <a:t>    &amp;&amp; </a:t>
+              <a:rPr lang="en-US" sz="800" dirty="0" smtClean="0"/>
+              <a:t>(root[y</a:t>
+            </a:r>
+            <a:r>
+              <a:rPr lang="en-US" sz="800" dirty="0"/>
+              <a:t>])</a:t>
+            </a:r>
+          </a:p>
+          <a:p>
+            <a:r>
+              <a:rPr lang="en-US" sz="800" dirty="0"/>
+              <a:t> </a:t>
+            </a:r>
+            <a:r>
+              <a:rPr lang="en-US" sz="800" dirty="0" smtClean="0"/>
+              <a:t>    </a:t>
+            </a:r>
+            <a:r>
+              <a:rPr lang="en-US" sz="800" dirty="0"/>
+              <a:t>&amp;&amp; White(Color[root[y]])</a:t>
+            </a:r>
+          </a:p>
+          <a:p>
+            <a:r>
+              <a:rPr lang="en-US" sz="800" dirty="0"/>
+              <a:t>   </a:t>
+            </a:r>
+            <a:r>
+              <a:rPr lang="en-US" sz="800" dirty="0" smtClean="0"/>
+              <a:t>  </a:t>
+            </a:r>
+            <a:r>
+              <a:rPr lang="en-US" sz="800" dirty="0"/>
+              <a:t>&amp;&amp; </a:t>
             </a:r>
             <a:r>
               <a:rPr lang="en-US" sz="800" dirty="0" err="1"/>
@@ -6217,8 +6303,21 @@
                   <a:schemeClr val="accent1"/>
                 </a:solidFill>
               </a:rPr>
-              <a:t>phase 4</a:t>
-            </a:r>
+              <a:t>phase </a:t>
+            </a:r>
+            <a:r>
+              <a:rPr lang="en-US" b="1" dirty="0" smtClean="0">
+                <a:solidFill>
+                  <a:schemeClr val="accent1"/>
+                </a:solidFill>
+              </a:rPr>
+              <a:t>5</a:t>
+            </a:r>
+            <a:endParaRPr lang="en-US" b="1" dirty="0">
+              <a:solidFill>
+                <a:schemeClr val="accent1"/>
+              </a:solidFill>
+            </a:endParaRPr>
           </a:p>
         </p:txBody>
       </p:sp>

</xml_diff>

<commit_message>
Revise and shorten gc.tex
</commit_message>
<xml_diff>
--- a/VerifiedGC.pptx
+++ b/VerifiedGC.pptx
@@ -2,12 +2,12 @@
 <file path=ppt/presentation.xml><?xml version="1.0" encoding="utf-8"?>
 <p:presentation xmlns:a="http://schemas.openxmlformats.org/drawingml/2006/main" xmlns:r="http://schemas.openxmlformats.org/officeDocument/2006/relationships" xmlns:p="http://schemas.openxmlformats.org/presentationml/2006/main" saveSubsetFonts="1">
   <p:sldMasterIdLst>
-    <p:sldMasterId id="2147483780" r:id="rId1"/>
+    <p:sldMasterId id="2147483816" r:id="rId1"/>
   </p:sldMasterIdLst>
   <p:sldIdLst>
     <p:sldId id="257" r:id="rId2"/>
   </p:sldIdLst>
-  <p:sldSz cx="6400800" cy="5943600"/>
+  <p:sldSz cx="6400800" cy="5715000"/>
   <p:notesSz cx="6858000" cy="9144000"/>
   <p:defaultTextStyle>
     <a:defPPr>
@@ -104,6 +104,11 @@
       </a:defRPr>
     </a:lvl9pPr>
   </p:defaultTextStyle>
+  <p:extLst>
+    <p:ext uri="{EFAFB233-063F-42B5-8137-9DF3F51BA10A}">
+      <p15:sldGuideLst xmlns:p15="http://schemas.microsoft.com/office/powerpoint/2012/main"/>
+    </p:ext>
+  </p:extLst>
 </p:presentation>
 </file>
 
@@ -136,8 +141,8 @@
         </p:nvSpPr>
         <p:spPr>
           <a:xfrm>
-            <a:off x="480060" y="972715"/>
-            <a:ext cx="5440680" cy="2069253"/>
+            <a:off x="480060" y="935302"/>
+            <a:ext cx="5440680" cy="1989667"/>
           </a:xfrm>
         </p:spPr>
         <p:txBody>
@@ -168,8 +173,8 @@
         </p:nvSpPr>
         <p:spPr>
           <a:xfrm>
-            <a:off x="800100" y="3121766"/>
-            <a:ext cx="4800600" cy="1434994"/>
+            <a:off x="800100" y="3001698"/>
+            <a:ext cx="4800600" cy="1379802"/>
           </a:xfrm>
         </p:spPr>
         <p:txBody>
@@ -238,7 +243,7 @@
           <a:p>
             <a:fld id="{20507B74-BD1D-4910-9354-6C6C7262377A}" type="datetimeFigureOut">
               <a:rPr lang="en-US" smtClean="0"/>
-              <a:t>7/5/2014</a:t>
+              <a:t>7/7/2014</a:t>
             </a:fld>
             <a:endParaRPr lang="en-US"/>
           </a:p>
@@ -289,7 +294,7 @@
     </p:spTree>
     <p:extLst>
       <p:ext uri="{BB962C8B-B14F-4D97-AF65-F5344CB8AC3E}">
-        <p14:creationId xmlns:p14="http://schemas.microsoft.com/office/powerpoint/2010/main" val="3163946173"/>
+        <p14:creationId xmlns:p14="http://schemas.microsoft.com/office/powerpoint/2010/main" val="3202803324"/>
       </p:ext>
     </p:extLst>
   </p:cSld>
@@ -408,7 +413,7 @@
           <a:p>
             <a:fld id="{20507B74-BD1D-4910-9354-6C6C7262377A}" type="datetimeFigureOut">
               <a:rPr lang="en-US" smtClean="0"/>
-              <a:t>7/5/2014</a:t>
+              <a:t>7/7/2014</a:t>
             </a:fld>
             <a:endParaRPr lang="en-US"/>
           </a:p>
@@ -459,7 +464,7 @@
     </p:spTree>
     <p:extLst>
       <p:ext uri="{BB962C8B-B14F-4D97-AF65-F5344CB8AC3E}">
-        <p14:creationId xmlns:p14="http://schemas.microsoft.com/office/powerpoint/2010/main" val="3852367263"/>
+        <p14:creationId xmlns:p14="http://schemas.microsoft.com/office/powerpoint/2010/main" val="843122362"/>
       </p:ext>
     </p:extLst>
   </p:cSld>
@@ -498,8 +503,8 @@
         </p:nvSpPr>
         <p:spPr>
           <a:xfrm>
-            <a:off x="4580573" y="316442"/>
-            <a:ext cx="1380173" cy="5036926"/>
+            <a:off x="4580573" y="304271"/>
+            <a:ext cx="1380173" cy="4843198"/>
           </a:xfrm>
         </p:spPr>
         <p:txBody>
@@ -526,8 +531,8 @@
         </p:nvSpPr>
         <p:spPr>
           <a:xfrm>
-            <a:off x="440055" y="316442"/>
-            <a:ext cx="4060508" cy="5036926"/>
+            <a:off x="440055" y="304271"/>
+            <a:ext cx="4060508" cy="4843198"/>
           </a:xfrm>
         </p:spPr>
         <p:txBody>
@@ -588,7 +593,7 @@
           <a:p>
             <a:fld id="{20507B74-BD1D-4910-9354-6C6C7262377A}" type="datetimeFigureOut">
               <a:rPr lang="en-US" smtClean="0"/>
-              <a:t>7/5/2014</a:t>
+              <a:t>7/7/2014</a:t>
             </a:fld>
             <a:endParaRPr lang="en-US"/>
           </a:p>
@@ -639,7 +644,7 @@
     </p:spTree>
     <p:extLst>
       <p:ext uri="{BB962C8B-B14F-4D97-AF65-F5344CB8AC3E}">
-        <p14:creationId xmlns:p14="http://schemas.microsoft.com/office/powerpoint/2010/main" val="1486018337"/>
+        <p14:creationId xmlns:p14="http://schemas.microsoft.com/office/powerpoint/2010/main" val="818964288"/>
       </p:ext>
     </p:extLst>
   </p:cSld>
@@ -758,7 +763,7 @@
           <a:p>
             <a:fld id="{20507B74-BD1D-4910-9354-6C6C7262377A}" type="datetimeFigureOut">
               <a:rPr lang="en-US" smtClean="0"/>
-              <a:t>7/5/2014</a:t>
+              <a:t>7/7/2014</a:t>
             </a:fld>
             <a:endParaRPr lang="en-US"/>
           </a:p>
@@ -809,7 +814,7 @@
     </p:spTree>
     <p:extLst>
       <p:ext uri="{BB962C8B-B14F-4D97-AF65-F5344CB8AC3E}">
-        <p14:creationId xmlns:p14="http://schemas.microsoft.com/office/powerpoint/2010/main" val="1668822185"/>
+        <p14:creationId xmlns:p14="http://schemas.microsoft.com/office/powerpoint/2010/main" val="3594696160"/>
       </p:ext>
     </p:extLst>
   </p:cSld>
@@ -848,8 +853,8 @@
         </p:nvSpPr>
         <p:spPr>
           <a:xfrm>
-            <a:off x="436722" y="1481774"/>
-            <a:ext cx="5520690" cy="2472372"/>
+            <a:off x="436722" y="1424783"/>
+            <a:ext cx="5520690" cy="2377281"/>
           </a:xfrm>
         </p:spPr>
         <p:txBody>
@@ -880,8 +885,8 @@
         </p:nvSpPr>
         <p:spPr>
           <a:xfrm>
-            <a:off x="436722" y="3977536"/>
-            <a:ext cx="5520690" cy="1300162"/>
+            <a:off x="436722" y="3824554"/>
+            <a:ext cx="5520690" cy="1250156"/>
           </a:xfrm>
         </p:spPr>
         <p:txBody>
@@ -1002,7 +1007,7 @@
           <a:p>
             <a:fld id="{20507B74-BD1D-4910-9354-6C6C7262377A}" type="datetimeFigureOut">
               <a:rPr lang="en-US" smtClean="0"/>
-              <a:t>7/5/2014</a:t>
+              <a:t>7/7/2014</a:t>
             </a:fld>
             <a:endParaRPr lang="en-US"/>
           </a:p>
@@ -1053,7 +1058,7 @@
     </p:spTree>
     <p:extLst>
       <p:ext uri="{BB962C8B-B14F-4D97-AF65-F5344CB8AC3E}">
-        <p14:creationId xmlns:p14="http://schemas.microsoft.com/office/powerpoint/2010/main" val="875729103"/>
+        <p14:creationId xmlns:p14="http://schemas.microsoft.com/office/powerpoint/2010/main" val="733153467"/>
       </p:ext>
     </p:extLst>
   </p:cSld>
@@ -1115,8 +1120,8 @@
         </p:nvSpPr>
         <p:spPr>
           <a:xfrm>
-            <a:off x="440055" y="1582208"/>
-            <a:ext cx="2720340" cy="3771160"/>
+            <a:off x="440055" y="1521354"/>
+            <a:ext cx="2720340" cy="3626115"/>
           </a:xfrm>
         </p:spPr>
         <p:txBody>
@@ -1172,8 +1177,8 @@
         </p:nvSpPr>
         <p:spPr>
           <a:xfrm>
-            <a:off x="3240405" y="1582208"/>
-            <a:ext cx="2720340" cy="3771160"/>
+            <a:off x="3240405" y="1521354"/>
+            <a:ext cx="2720340" cy="3626115"/>
           </a:xfrm>
         </p:spPr>
         <p:txBody>
@@ -1234,7 +1239,7 @@
           <a:p>
             <a:fld id="{20507B74-BD1D-4910-9354-6C6C7262377A}" type="datetimeFigureOut">
               <a:rPr lang="en-US" smtClean="0"/>
-              <a:t>7/5/2014</a:t>
+              <a:t>7/7/2014</a:t>
             </a:fld>
             <a:endParaRPr lang="en-US"/>
           </a:p>
@@ -1285,7 +1290,7 @@
     </p:spTree>
     <p:extLst>
       <p:ext uri="{BB962C8B-B14F-4D97-AF65-F5344CB8AC3E}">
-        <p14:creationId xmlns:p14="http://schemas.microsoft.com/office/powerpoint/2010/main" val="3163630453"/>
+        <p14:creationId xmlns:p14="http://schemas.microsoft.com/office/powerpoint/2010/main" val="944498302"/>
       </p:ext>
     </p:extLst>
   </p:cSld>
@@ -1324,8 +1329,8 @@
         </p:nvSpPr>
         <p:spPr>
           <a:xfrm>
-            <a:off x="440889" y="316443"/>
-            <a:ext cx="5520690" cy="1148821"/>
+            <a:off x="440889" y="304272"/>
+            <a:ext cx="5520690" cy="1104636"/>
           </a:xfrm>
         </p:spPr>
         <p:txBody>
@@ -1352,8 +1357,8 @@
         </p:nvSpPr>
         <p:spPr>
           <a:xfrm>
-            <a:off x="440889" y="1457008"/>
-            <a:ext cx="2707838" cy="714057"/>
+            <a:off x="440889" y="1400969"/>
+            <a:ext cx="2707838" cy="686593"/>
           </a:xfrm>
         </p:spPr>
         <p:txBody>
@@ -1417,8 +1422,8 @@
         </p:nvSpPr>
         <p:spPr>
           <a:xfrm>
-            <a:off x="440889" y="2171065"/>
-            <a:ext cx="2707838" cy="3193310"/>
+            <a:off x="440889" y="2087563"/>
+            <a:ext cx="2707838" cy="3070490"/>
           </a:xfrm>
         </p:spPr>
         <p:txBody>
@@ -1474,8 +1479,8 @@
         </p:nvSpPr>
         <p:spPr>
           <a:xfrm>
-            <a:off x="3240405" y="1457008"/>
-            <a:ext cx="2721174" cy="714057"/>
+            <a:off x="3240405" y="1400969"/>
+            <a:ext cx="2721174" cy="686593"/>
           </a:xfrm>
         </p:spPr>
         <p:txBody>
@@ -1539,8 +1544,8 @@
         </p:nvSpPr>
         <p:spPr>
           <a:xfrm>
-            <a:off x="3240405" y="2171065"/>
-            <a:ext cx="2721174" cy="3193310"/>
+            <a:off x="3240405" y="2087563"/>
+            <a:ext cx="2721174" cy="3070490"/>
           </a:xfrm>
         </p:spPr>
         <p:txBody>
@@ -1601,7 +1606,7 @@
           <a:p>
             <a:fld id="{20507B74-BD1D-4910-9354-6C6C7262377A}" type="datetimeFigureOut">
               <a:rPr lang="en-US" smtClean="0"/>
-              <a:t>7/5/2014</a:t>
+              <a:t>7/7/2014</a:t>
             </a:fld>
             <a:endParaRPr lang="en-US"/>
           </a:p>
@@ -1652,7 +1657,7 @@
     </p:spTree>
     <p:extLst>
       <p:ext uri="{BB962C8B-B14F-4D97-AF65-F5344CB8AC3E}">
-        <p14:creationId xmlns:p14="http://schemas.microsoft.com/office/powerpoint/2010/main" val="2009955480"/>
+        <p14:creationId xmlns:p14="http://schemas.microsoft.com/office/powerpoint/2010/main" val="1909468011"/>
       </p:ext>
     </p:extLst>
   </p:cSld>
@@ -1719,7 +1724,7 @@
           <a:p>
             <a:fld id="{20507B74-BD1D-4910-9354-6C6C7262377A}" type="datetimeFigureOut">
               <a:rPr lang="en-US" smtClean="0"/>
-              <a:t>7/5/2014</a:t>
+              <a:t>7/7/2014</a:t>
             </a:fld>
             <a:endParaRPr lang="en-US"/>
           </a:p>
@@ -1770,7 +1775,7 @@
     </p:spTree>
     <p:extLst>
       <p:ext uri="{BB962C8B-B14F-4D97-AF65-F5344CB8AC3E}">
-        <p14:creationId xmlns:p14="http://schemas.microsoft.com/office/powerpoint/2010/main" val="1205833201"/>
+        <p14:creationId xmlns:p14="http://schemas.microsoft.com/office/powerpoint/2010/main" val="501391293"/>
       </p:ext>
     </p:extLst>
   </p:cSld>
@@ -1814,7 +1819,7 @@
           <a:p>
             <a:fld id="{20507B74-BD1D-4910-9354-6C6C7262377A}" type="datetimeFigureOut">
               <a:rPr lang="en-US" smtClean="0"/>
-              <a:t>7/5/2014</a:t>
+              <a:t>7/7/2014</a:t>
             </a:fld>
             <a:endParaRPr lang="en-US"/>
           </a:p>
@@ -1865,7 +1870,7 @@
     </p:spTree>
     <p:extLst>
       <p:ext uri="{BB962C8B-B14F-4D97-AF65-F5344CB8AC3E}">
-        <p14:creationId xmlns:p14="http://schemas.microsoft.com/office/powerpoint/2010/main" val="2532746509"/>
+        <p14:creationId xmlns:p14="http://schemas.microsoft.com/office/powerpoint/2010/main" val="3338559473"/>
       </p:ext>
     </p:extLst>
   </p:cSld>
@@ -1904,8 +1909,8 @@
         </p:nvSpPr>
         <p:spPr>
           <a:xfrm>
-            <a:off x="440889" y="396240"/>
-            <a:ext cx="2064425" cy="1386840"/>
+            <a:off x="440889" y="381000"/>
+            <a:ext cx="2064425" cy="1333500"/>
           </a:xfrm>
         </p:spPr>
         <p:txBody>
@@ -1936,8 +1941,8 @@
         </p:nvSpPr>
         <p:spPr>
           <a:xfrm>
-            <a:off x="2721174" y="855770"/>
-            <a:ext cx="3240405" cy="4223808"/>
+            <a:off x="2721174" y="822856"/>
+            <a:ext cx="3240405" cy="4061354"/>
           </a:xfrm>
         </p:spPr>
         <p:txBody>
@@ -2021,8 +2026,8 @@
         </p:nvSpPr>
         <p:spPr>
           <a:xfrm>
-            <a:off x="440889" y="1783080"/>
-            <a:ext cx="2064425" cy="3303376"/>
+            <a:off x="440889" y="1714500"/>
+            <a:ext cx="2064425" cy="3176323"/>
           </a:xfrm>
         </p:spPr>
         <p:txBody>
@@ -2091,7 +2096,7 @@
           <a:p>
             <a:fld id="{20507B74-BD1D-4910-9354-6C6C7262377A}" type="datetimeFigureOut">
               <a:rPr lang="en-US" smtClean="0"/>
-              <a:t>7/5/2014</a:t>
+              <a:t>7/7/2014</a:t>
             </a:fld>
             <a:endParaRPr lang="en-US"/>
           </a:p>
@@ -2142,7 +2147,7 @@
     </p:spTree>
     <p:extLst>
       <p:ext uri="{BB962C8B-B14F-4D97-AF65-F5344CB8AC3E}">
-        <p14:creationId xmlns:p14="http://schemas.microsoft.com/office/powerpoint/2010/main" val="2722652584"/>
+        <p14:creationId xmlns:p14="http://schemas.microsoft.com/office/powerpoint/2010/main" val="229499926"/>
       </p:ext>
     </p:extLst>
   </p:cSld>
@@ -2181,8 +2186,8 @@
         </p:nvSpPr>
         <p:spPr>
           <a:xfrm>
-            <a:off x="440889" y="396240"/>
-            <a:ext cx="2064425" cy="1386840"/>
+            <a:off x="440889" y="381000"/>
+            <a:ext cx="2064425" cy="1333500"/>
           </a:xfrm>
         </p:spPr>
         <p:txBody>
@@ -2213,8 +2218,8 @@
         </p:nvSpPr>
         <p:spPr>
           <a:xfrm>
-            <a:off x="2721174" y="855770"/>
-            <a:ext cx="3240405" cy="4223808"/>
+            <a:off x="2721174" y="822856"/>
+            <a:ext cx="3240405" cy="4061354"/>
           </a:xfrm>
         </p:spPr>
         <p:txBody>
@@ -2278,8 +2283,8 @@
         </p:nvSpPr>
         <p:spPr>
           <a:xfrm>
-            <a:off x="440889" y="1783080"/>
-            <a:ext cx="2064425" cy="3303376"/>
+            <a:off x="440889" y="1714500"/>
+            <a:ext cx="2064425" cy="3176323"/>
           </a:xfrm>
         </p:spPr>
         <p:txBody>
@@ -2348,7 +2353,7 @@
           <a:p>
             <a:fld id="{20507B74-BD1D-4910-9354-6C6C7262377A}" type="datetimeFigureOut">
               <a:rPr lang="en-US" smtClean="0"/>
-              <a:t>7/5/2014</a:t>
+              <a:t>7/7/2014</a:t>
             </a:fld>
             <a:endParaRPr lang="en-US"/>
           </a:p>
@@ -2399,7 +2404,7 @@
     </p:spTree>
     <p:extLst>
       <p:ext uri="{BB962C8B-B14F-4D97-AF65-F5344CB8AC3E}">
-        <p14:creationId xmlns:p14="http://schemas.microsoft.com/office/powerpoint/2010/main" val="1396739712"/>
+        <p14:creationId xmlns:p14="http://schemas.microsoft.com/office/powerpoint/2010/main" val="3611569043"/>
       </p:ext>
     </p:extLst>
   </p:cSld>
@@ -2443,8 +2448,8 @@
         </p:nvSpPr>
         <p:spPr>
           <a:xfrm>
-            <a:off x="440055" y="316443"/>
-            <a:ext cx="5520690" cy="1148821"/>
+            <a:off x="440055" y="304272"/>
+            <a:ext cx="5520690" cy="1104636"/>
           </a:xfrm>
           <a:prstGeom prst="rect">
             <a:avLst/>
@@ -2476,8 +2481,8 @@
         </p:nvSpPr>
         <p:spPr>
           <a:xfrm>
-            <a:off x="440055" y="1582208"/>
-            <a:ext cx="5520690" cy="3771160"/>
+            <a:off x="440055" y="1521354"/>
+            <a:ext cx="5520690" cy="3626115"/>
           </a:xfrm>
           <a:prstGeom prst="rect">
             <a:avLst/>
@@ -2538,8 +2543,8 @@
         </p:nvSpPr>
         <p:spPr>
           <a:xfrm>
-            <a:off x="440055" y="5508838"/>
-            <a:ext cx="1440180" cy="316442"/>
+            <a:off x="440055" y="5296960"/>
+            <a:ext cx="1440180" cy="304271"/>
           </a:xfrm>
           <a:prstGeom prst="rect">
             <a:avLst/>
@@ -2561,7 +2566,7 @@
           <a:p>
             <a:fld id="{20507B74-BD1D-4910-9354-6C6C7262377A}" type="datetimeFigureOut">
               <a:rPr lang="en-US" smtClean="0"/>
-              <a:t>7/5/2014</a:t>
+              <a:t>7/7/2014</a:t>
             </a:fld>
             <a:endParaRPr lang="en-US"/>
           </a:p>
@@ -2579,8 +2584,8 @@
         </p:nvSpPr>
         <p:spPr>
           <a:xfrm>
-            <a:off x="2120265" y="5508838"/>
-            <a:ext cx="2160270" cy="316442"/>
+            <a:off x="2120265" y="5296960"/>
+            <a:ext cx="2160270" cy="304271"/>
           </a:xfrm>
           <a:prstGeom prst="rect">
             <a:avLst/>
@@ -2616,8 +2621,8 @@
         </p:nvSpPr>
         <p:spPr>
           <a:xfrm>
-            <a:off x="4520565" y="5508838"/>
-            <a:ext cx="1440180" cy="316442"/>
+            <a:off x="4520565" y="5296960"/>
+            <a:ext cx="1440180" cy="304271"/>
           </a:xfrm>
           <a:prstGeom prst="rect">
             <a:avLst/>
@@ -2648,23 +2653,23 @@
     </p:spTree>
     <p:extLst>
       <p:ext uri="{BB962C8B-B14F-4D97-AF65-F5344CB8AC3E}">
-        <p14:creationId xmlns:p14="http://schemas.microsoft.com/office/powerpoint/2010/main" val="2396496758"/>
+        <p14:creationId xmlns:p14="http://schemas.microsoft.com/office/powerpoint/2010/main" val="2860341203"/>
       </p:ext>
     </p:extLst>
   </p:cSld>
   <p:clrMap bg1="lt1" tx1="dk1" bg2="lt2" tx2="dk2" accent1="accent1" accent2="accent2" accent3="accent3" accent4="accent4" accent5="accent5" accent6="accent6" hlink="hlink" folHlink="folHlink"/>
   <p:sldLayoutIdLst>
-    <p:sldLayoutId id="2147483781" r:id="rId1"/>
-    <p:sldLayoutId id="2147483782" r:id="rId2"/>
-    <p:sldLayoutId id="2147483783" r:id="rId3"/>
-    <p:sldLayoutId id="2147483784" r:id="rId4"/>
-    <p:sldLayoutId id="2147483785" r:id="rId5"/>
-    <p:sldLayoutId id="2147483786" r:id="rId6"/>
-    <p:sldLayoutId id="2147483787" r:id="rId7"/>
-    <p:sldLayoutId id="2147483788" r:id="rId8"/>
-    <p:sldLayoutId id="2147483789" r:id="rId9"/>
-    <p:sldLayoutId id="2147483790" r:id="rId10"/>
-    <p:sldLayoutId id="2147483791" r:id="rId11"/>
+    <p:sldLayoutId id="2147483817" r:id="rId1"/>
+    <p:sldLayoutId id="2147483818" r:id="rId2"/>
+    <p:sldLayoutId id="2147483819" r:id="rId3"/>
+    <p:sldLayoutId id="2147483820" r:id="rId4"/>
+    <p:sldLayoutId id="2147483821" r:id="rId5"/>
+    <p:sldLayoutId id="2147483822" r:id="rId6"/>
+    <p:sldLayoutId id="2147483823" r:id="rId7"/>
+    <p:sldLayoutId id="2147483824" r:id="rId8"/>
+    <p:sldLayoutId id="2147483825" r:id="rId9"/>
+    <p:sldLayoutId id="2147483826" r:id="rId10"/>
+    <p:sldLayoutId id="2147483827" r:id="rId11"/>
   </p:sldLayoutIdLst>
   <p:txStyles>
     <p:titleStyle>
@@ -2974,7 +2979,7 @@
         </p:nvSpPr>
         <p:spPr>
           <a:xfrm>
-            <a:off x="4052668" y="2259241"/>
+            <a:off x="4052673" y="2192647"/>
             <a:ext cx="2327539" cy="1446550"/>
           </a:xfrm>
           <a:prstGeom prst="rect">
@@ -3233,7 +3238,7 @@
         </p:nvSpPr>
         <p:spPr>
           <a:xfrm>
-            <a:off x="2490374" y="3831115"/>
+            <a:off x="2490379" y="3764526"/>
             <a:ext cx="2097369" cy="954107"/>
           </a:xfrm>
           <a:prstGeom prst="rect">
@@ -3427,7 +3432,7 @@
         </p:nvSpPr>
         <p:spPr>
           <a:xfrm>
-            <a:off x="2165561" y="2259244"/>
+            <a:off x="2165566" y="2192655"/>
             <a:ext cx="1768983" cy="830997"/>
           </a:xfrm>
           <a:prstGeom prst="rect">
@@ -3555,13 +3560,8 @@
           <a:p>
             <a:r>
               <a:rPr lang="en-US" sz="800" dirty="0"/>
-              <a:t>    } </a:t>
-            </a:r>
-            <a:r>
-              <a:rPr lang="en-US" sz="800" dirty="0" smtClean="0"/>
-              <a:t>}</a:t>
-            </a:r>
-            <a:endParaRPr lang="en-US" sz="800" dirty="0"/>
+              <a:t>    } }</a:t>
+            </a:r>
           </a:p>
         </p:txBody>
       </p:sp>
@@ -3573,8 +3573,8 @@
         </p:nvSpPr>
         <p:spPr>
           <a:xfrm>
-            <a:off x="4047002" y="17847"/>
-            <a:ext cx="2286523" cy="707886"/>
+            <a:off x="4128895" y="18304"/>
+            <a:ext cx="2240357" cy="707886"/>
           </a:xfrm>
           <a:prstGeom prst="rect">
             <a:avLst/>
@@ -3595,7 +3595,7 @@
           </a:fontRef>
         </p:style>
         <p:txBody>
-          <a:bodyPr wrap="none" lIns="45720" rtlCol="0">
+          <a:bodyPr wrap="none" lIns="45720" rIns="45720" rtlCol="0">
             <a:spAutoFit/>
           </a:bodyPr>
           <a:lstStyle/>
@@ -3739,7 +3739,7 @@
         </p:nvSpPr>
         <p:spPr>
           <a:xfrm>
-            <a:off x="4364564" y="626465"/>
+            <a:off x="4364564" y="626922"/>
             <a:ext cx="1919436" cy="1077218"/>
           </a:xfrm>
           <a:prstGeom prst="rect">
@@ -3910,8 +3910,8 @@
         </p:nvSpPr>
         <p:spPr>
           <a:xfrm>
-            <a:off x="2276396" y="761849"/>
-            <a:ext cx="1845698" cy="707886"/>
+            <a:off x="2194508" y="694066"/>
+            <a:ext cx="1865104" cy="707886"/>
           </a:xfrm>
           <a:prstGeom prst="rect">
             <a:avLst/>
@@ -3932,7 +3932,7 @@
           </a:fontRef>
         </p:style>
         <p:txBody>
-          <a:bodyPr wrap="none" lIns="45720" rtlCol="0">
+          <a:bodyPr wrap="square" lIns="45720" rIns="45720" rtlCol="0">
             <a:spAutoFit/>
           </a:bodyPr>
           <a:lstStyle/>
@@ -3973,7 +3973,7 @@
             </a:r>
             <a:r>
               <a:rPr lang="en-US" sz="800" dirty="0"/>
-              <a:t>, x:idx, f:fld, y:idx){</a:t>
+              <a:t>, x:idx, f:fld, y:idx) {</a:t>
             </a:r>
           </a:p>
           <a:p>
@@ -4036,7 +4036,7 @@
         </p:nvSpPr>
         <p:spPr>
           <a:xfrm>
-            <a:off x="2436866" y="1316137"/>
+            <a:off x="2354978" y="1248359"/>
             <a:ext cx="1704634" cy="830997"/>
           </a:xfrm>
           <a:prstGeom prst="rect">
@@ -4219,8 +4219,8 @@
         </p:nvSpPr>
         <p:spPr>
           <a:xfrm>
-            <a:off x="267086" y="770746"/>
-            <a:ext cx="1818447" cy="584775"/>
+            <a:off x="267086" y="702968"/>
+            <a:ext cx="1794722" cy="584775"/>
           </a:xfrm>
           <a:prstGeom prst="rect">
             <a:avLst/>
@@ -4241,7 +4241,7 @@
           </a:fontRef>
         </p:style>
         <p:txBody>
-          <a:bodyPr wrap="none" lIns="45720" rtlCol="0">
+          <a:bodyPr wrap="none" lIns="45720" rIns="45720" rtlCol="0">
             <a:spAutoFit/>
           </a:bodyPr>
           <a:lstStyle/>
@@ -4279,7 +4279,7 @@
             </a:r>
             <a:r>
               <a:rPr lang="en-US" sz="800" dirty="0"/>
-              <a:t>, x:idx, f:fld, y:idx){</a:t>
+              <a:t>, x:idx, f:fld, y:idx) {</a:t>
             </a:r>
           </a:p>
           <a:p>
@@ -4320,7 +4320,7 @@
         </p:nvSpPr>
         <p:spPr>
           <a:xfrm>
-            <a:off x="427555" y="1317651"/>
+            <a:off x="427555" y="1249873"/>
             <a:ext cx="1704634" cy="830997"/>
           </a:xfrm>
           <a:prstGeom prst="rect">
@@ -4503,8 +4503,8 @@
         </p:nvSpPr>
         <p:spPr>
           <a:xfrm>
-            <a:off x="47076" y="17852"/>
-            <a:ext cx="2443298" cy="584775"/>
+            <a:off x="47081" y="18314"/>
+            <a:ext cx="2350965" cy="584775"/>
           </a:xfrm>
           <a:prstGeom prst="rect">
             <a:avLst/>
@@ -4525,7 +4525,7 @@
           </a:fontRef>
         </p:style>
         <p:txBody>
-          <a:bodyPr wrap="none" lIns="45720" rtlCol="0">
+          <a:bodyPr wrap="none" lIns="45720" rIns="45720" rtlCol="0">
             <a:spAutoFit/>
           </a:bodyPr>
           <a:lstStyle/>
@@ -4631,7 +4631,7 @@
         </p:nvSpPr>
         <p:spPr>
           <a:xfrm>
-            <a:off x="2594508" y="17848"/>
+            <a:off x="2594513" y="18305"/>
             <a:ext cx="1254189" cy="338554"/>
           </a:xfrm>
           <a:prstGeom prst="rect">
@@ -4707,7 +4707,7 @@
         </p:nvSpPr>
         <p:spPr>
           <a:xfrm>
-            <a:off x="2553475" y="306671"/>
+            <a:off x="2553480" y="307128"/>
             <a:ext cx="1425711" cy="338554"/>
           </a:xfrm>
           <a:prstGeom prst="rect">
@@ -4778,7 +4778,7 @@
         </p:nvCxnSpPr>
         <p:spPr>
           <a:xfrm flipV="1">
-            <a:off x="0" y="2200656"/>
+            <a:off x="0" y="2132878"/>
             <a:ext cx="6400800" cy="7375"/>
           </a:xfrm>
           <a:prstGeom prst="line">
@@ -4809,26 +4809,28 @@
         </p:nvSpPr>
         <p:spPr>
           <a:xfrm>
-            <a:off x="5573984" y="1750174"/>
+            <a:off x="5573984" y="1682391"/>
             <a:ext cx="759542" cy="385762"/>
           </a:xfrm>
           <a:prstGeom prst="roundRect">
             <a:avLst/>
           </a:prstGeom>
-          <a:ln w="28575"/>
+          <a:ln/>
         </p:spPr>
         <p:style>
           <a:lnRef idx="2">
-            <a:schemeClr val="accent1"/>
+            <a:schemeClr val="accent1">
+              <a:shade val="50000"/>
+            </a:schemeClr>
           </a:lnRef>
           <a:fillRef idx="1">
-            <a:schemeClr val="lt1"/>
+            <a:schemeClr val="accent1"/>
           </a:fillRef>
           <a:effectRef idx="0">
             <a:schemeClr val="accent1"/>
           </a:effectRef>
           <a:fontRef idx="minor">
-            <a:schemeClr val="dk1"/>
+            <a:schemeClr val="lt1"/>
           </a:fontRef>
         </p:style>
         <p:txBody>
@@ -4844,31 +4846,18 @@
             <a:r>
               <a:rPr lang="en-US" b="1" dirty="0">
                 <a:solidFill>
-                  <a:schemeClr val="accent1"/>
+                  <a:schemeClr val="bg1"/>
                 </a:solidFill>
               </a:rPr>
-              <a:t>phase </a:t>
-            </a:r>
-            <a:r>
-              <a:rPr lang="en-US" b="1" dirty="0" smtClean="0">
-                <a:solidFill>
-                  <a:schemeClr val="accent1"/>
-                </a:solidFill>
-              </a:rPr>
-              <a:t>6</a:t>
-            </a:r>
-            <a:endParaRPr lang="en-US" b="1" dirty="0">
-              <a:solidFill>
-                <a:schemeClr val="accent1"/>
-              </a:solidFill>
-            </a:endParaRPr>
+              <a:t>phase 6</a:t>
+            </a:r>
           </a:p>
           <a:p>
             <a:pPr algn="ctr"/>
             <a:r>
               <a:rPr lang="en-US" b="1" dirty="0">
                 <a:solidFill>
-                  <a:schemeClr val="accent1"/>
+                  <a:schemeClr val="bg1"/>
                 </a:solidFill>
               </a:rPr>
               <a:t>interface</a:t>
@@ -4884,7 +4873,7 @@
         </p:nvSpPr>
         <p:spPr>
           <a:xfrm>
-            <a:off x="47079" y="2259241"/>
+            <a:off x="47079" y="2192647"/>
             <a:ext cx="2038452" cy="1446550"/>
           </a:xfrm>
           <a:prstGeom prst="rect">
@@ -5070,26 +5059,28 @@
         </p:nvSpPr>
         <p:spPr>
           <a:xfrm>
-            <a:off x="511301" y="3333414"/>
+            <a:off x="511301" y="3266820"/>
             <a:ext cx="759542" cy="385762"/>
           </a:xfrm>
           <a:prstGeom prst="roundRect">
             <a:avLst/>
           </a:prstGeom>
-          <a:ln w="28575"/>
+          <a:ln/>
         </p:spPr>
         <p:style>
           <a:lnRef idx="2">
-            <a:schemeClr val="accent1"/>
+            <a:schemeClr val="accent1">
+              <a:shade val="50000"/>
+            </a:schemeClr>
           </a:lnRef>
           <a:fillRef idx="1">
-            <a:schemeClr val="lt1"/>
+            <a:schemeClr val="accent1"/>
           </a:fillRef>
           <a:effectRef idx="0">
             <a:schemeClr val="accent1"/>
           </a:effectRef>
           <a:fontRef idx="minor">
-            <a:schemeClr val="dk1"/>
+            <a:schemeClr val="lt1"/>
           </a:fontRef>
         </p:style>
         <p:txBody>
@@ -5105,31 +5096,18 @@
             <a:r>
               <a:rPr lang="en-US" b="1" dirty="0">
                 <a:solidFill>
-                  <a:schemeClr val="accent1"/>
+                  <a:schemeClr val="bg1"/>
                 </a:solidFill>
               </a:rPr>
-              <a:t>phase </a:t>
-            </a:r>
-            <a:r>
-              <a:rPr lang="en-US" b="1" dirty="0" smtClean="0">
-                <a:solidFill>
-                  <a:schemeClr val="accent1"/>
-                </a:solidFill>
-              </a:rPr>
-              <a:t>6</a:t>
-            </a:r>
-            <a:endParaRPr lang="en-US" b="1" dirty="0">
-              <a:solidFill>
-                <a:schemeClr val="accent1"/>
-              </a:solidFill>
-            </a:endParaRPr>
+              <a:t>phase 6</a:t>
+            </a:r>
           </a:p>
           <a:p>
             <a:pPr algn="ctr"/>
             <a:r>
               <a:rPr lang="en-US" b="1" dirty="0">
                 <a:solidFill>
-                  <a:schemeClr val="accent1"/>
+                  <a:schemeClr val="bg1"/>
                 </a:solidFill>
               </a:rPr>
               <a:t>internals</a:t>
@@ -5145,7 +5123,7 @@
         </p:nvCxnSpPr>
         <p:spPr>
           <a:xfrm>
-            <a:off x="122389" y="602627"/>
+            <a:off x="122394" y="536033"/>
             <a:ext cx="109565" cy="1708230"/>
           </a:xfrm>
           <a:prstGeom prst="straightConnector1">
@@ -5178,7 +5156,7 @@
         </p:nvCxnSpPr>
         <p:spPr>
           <a:xfrm flipV="1">
-            <a:off x="0" y="3760467"/>
+            <a:off x="0" y="3693878"/>
             <a:ext cx="6400800" cy="7375"/>
           </a:xfrm>
           <a:prstGeom prst="line">
@@ -5209,7 +5187,7 @@
         </p:nvSpPr>
         <p:spPr>
           <a:xfrm>
-            <a:off x="47076" y="3819677"/>
+            <a:off x="47081" y="3753083"/>
             <a:ext cx="2350643" cy="1446550"/>
           </a:xfrm>
           <a:prstGeom prst="rect">
@@ -5466,26 +5444,18 @@
           <a:p>
             <a:r>
               <a:rPr lang="en-US" sz="800" dirty="0"/>
-              <a:t>    call </a:t>
-            </a:r>
-            <a:r>
-              <a:rPr lang="en-US" sz="800" dirty="0" err="1"/>
-              <a:t>allRootsDone</a:t>
-            </a:r>
-            <a:r>
-              <a:rPr lang="en-US" sz="800" dirty="0"/>
-              <a:t> := </a:t>
-            </a:r>
-            <a:r>
-              <a:rPr lang="en-US" sz="800" dirty="0" err="1"/>
-              <a:t>NoGrayInRootScanBarrier</a:t>
-            </a:r>
-            <a:r>
-              <a:rPr lang="en-US" sz="800" dirty="0"/>
+              <a:t>    call done := </a:t>
+            </a:r>
+            <a:r>
+              <a:rPr lang="en-US" sz="800" smtClean="0"/>
+              <a:t>IsGraySetEmpty</a:t>
+            </a:r>
+            <a:r>
+              <a:rPr lang="en-US" sz="800" dirty="0" smtClean="0"/>
               <a:t>(</a:t>
             </a:r>
             <a:r>
-              <a:rPr lang="en-US" sz="800" dirty="0" err="1"/>
+              <a:rPr lang="en-US" sz="800" dirty="0" err="1" smtClean="0"/>
               <a:t>tid</a:t>
             </a:r>
             <a:r>
@@ -5531,8 +5501,8 @@
         </p:nvSpPr>
         <p:spPr>
           <a:xfrm>
-            <a:off x="2496432" y="4901942"/>
-            <a:ext cx="2084225" cy="707886"/>
+            <a:off x="2496432" y="4835348"/>
+            <a:ext cx="2186886" cy="707886"/>
           </a:xfrm>
           <a:prstGeom prst="rect">
             <a:avLst/>
@@ -5553,7 +5523,7 @@
           </a:fontRef>
         </p:style>
         <p:txBody>
-          <a:bodyPr wrap="none" lIns="45720" rtlCol="0">
+          <a:bodyPr wrap="square" lIns="45720" rtlCol="0">
             <a:spAutoFit/>
           </a:bodyPr>
           <a:lstStyle/>
@@ -5713,7 +5683,7 @@
         </p:nvSpPr>
         <p:spPr>
           <a:xfrm>
-            <a:off x="647385" y="5159073"/>
+            <a:off x="647385" y="5044778"/>
             <a:ext cx="1739900" cy="584775"/>
           </a:xfrm>
           <a:prstGeom prst="rect">
@@ -5808,7 +5778,7 @@
         </p:nvSpPr>
         <p:spPr>
           <a:xfrm>
-            <a:off x="4528664" y="4834521"/>
+            <a:off x="4624079" y="4624805"/>
             <a:ext cx="1723870" cy="1077218"/>
           </a:xfrm>
           <a:prstGeom prst="rect">
@@ -5862,11 +5832,7 @@
           <a:p>
             <a:r>
               <a:rPr lang="en-US" sz="800" dirty="0"/>
-              <a:t>    </a:t>
-            </a:r>
-            <a:r>
-              <a:rPr lang="en-US" sz="800" dirty="0" smtClean="0"/>
-              <a:t> &amp;&amp; </a:t>
+              <a:t>     &amp;&amp; </a:t>
             </a:r>
             <a:r>
               <a:rPr lang="en-US" sz="800" dirty="0" err="1"/>
@@ -5896,15 +5862,7 @@
           <a:p>
             <a:r>
               <a:rPr lang="en-US" sz="800" dirty="0"/>
-              <a:t>   </a:t>
-            </a:r>
-            <a:r>
-              <a:rPr lang="en-US" sz="800" dirty="0" smtClean="0"/>
-              <a:t>  </a:t>
-            </a:r>
-            <a:r>
-              <a:rPr lang="en-US" sz="800" dirty="0"/>
-              <a:t>&amp;&amp; </a:t>
+              <a:t>     &amp;&amp; </a:t>
             </a:r>
             <a:r>
               <a:rPr lang="en-US" sz="800" dirty="0" err="1"/>
@@ -5934,11 +5892,7 @@
           <a:p>
             <a:r>
               <a:rPr lang="en-US" sz="800" dirty="0"/>
-              <a:t>    </a:t>
-            </a:r>
-            <a:r>
-              <a:rPr lang="en-US" sz="800" dirty="0" smtClean="0"/>
-              <a:t> &amp;&amp; </a:t>
+              <a:t>     &amp;&amp; </a:t>
             </a:r>
             <a:r>
               <a:rPr lang="en-US" sz="800" dirty="0" err="1"/>
@@ -5952,11 +5906,7 @@
           <a:p>
             <a:r>
               <a:rPr lang="en-US" sz="800" dirty="0"/>
-              <a:t>    </a:t>
-            </a:r>
-            <a:r>
-              <a:rPr lang="en-US" sz="800" dirty="0" smtClean="0"/>
-              <a:t> &amp;&amp; </a:t>
+              <a:t>     &amp;&amp; </a:t>
             </a:r>
             <a:r>
               <a:rPr lang="en-US" sz="800" dirty="0" err="1"/>
@@ -5969,12 +5919,8 @@
           </a:p>
           <a:p>
             <a:r>
-              <a:rPr lang="en-US" sz="800" dirty="0" smtClean="0"/>
-              <a:t>     </a:t>
-            </a:r>
-            <a:r>
-              <a:rPr lang="en-US" sz="800" dirty="0"/>
-              <a:t>&amp;&amp; </a:t>
+              <a:rPr lang="en-US" sz="800" dirty="0"/>
+              <a:t>     &amp;&amp; </a:t>
             </a:r>
             <a:r>
               <a:rPr lang="en-US" sz="800" dirty="0" err="1"/>
@@ -6035,7 +5981,7 @@
         </p:nvCxnSpPr>
         <p:spPr>
           <a:xfrm flipH="1">
-            <a:off x="2085449" y="2863672"/>
+            <a:off x="2085449" y="2797078"/>
             <a:ext cx="80112" cy="1012292"/>
           </a:xfrm>
           <a:prstGeom prst="straightConnector1">
@@ -6068,8 +6014,8 @@
         </p:nvSpPr>
         <p:spPr>
           <a:xfrm>
-            <a:off x="4545427" y="3804299"/>
-            <a:ext cx="1796004" cy="954107"/>
+            <a:off x="4545427" y="3737710"/>
+            <a:ext cx="1796004" cy="830997"/>
           </a:xfrm>
           <a:prstGeom prst="rect">
             <a:avLst/>
@@ -6122,15 +6068,7 @@
           <a:p>
             <a:r>
               <a:rPr lang="en-US" sz="800" dirty="0"/>
-              <a:t>  </a:t>
-            </a:r>
-            <a:r>
-              <a:rPr lang="en-US" sz="800" dirty="0" smtClean="0"/>
-              <a:t>   </a:t>
-            </a:r>
-            <a:r>
-              <a:rPr lang="en-US" sz="800" dirty="0"/>
-              <a:t>&amp;&amp; </a:t>
+              <a:t>     &amp;&amp; </a:t>
             </a:r>
             <a:r>
               <a:rPr lang="en-US" sz="800" dirty="0" err="1"/>
@@ -6160,55 +6098,27 @@
           <a:p>
             <a:r>
               <a:rPr lang="en-US" sz="800" dirty="0"/>
-              <a:t>if </a:t>
-            </a:r>
-            <a:r>
-              <a:rPr lang="en-US" sz="800"/>
-              <a:t>(   </a:t>
-            </a:r>
-            <a:r>
-              <a:rPr lang="en-US" sz="800" smtClean="0"/>
-              <a:t>     </a:t>
-            </a:r>
-            <a:r>
-              <a:rPr lang="en-US" sz="800" dirty="0" err="1" smtClean="0"/>
+              <a:t>if (        </a:t>
+            </a:r>
+            <a:r>
+              <a:rPr lang="en-US" sz="800" dirty="0" err="1"/>
               <a:t>memAddr</a:t>
             </a:r>
             <a:r>
-              <a:rPr lang="en-US" sz="800" dirty="0" smtClean="0"/>
-              <a:t>(root[y</a:t>
-            </a:r>
-            <a:r>
-              <a:rPr lang="en-US" sz="800" dirty="0"/>
-              <a:t>])</a:t>
-            </a:r>
-          </a:p>
-          <a:p>
-            <a:r>
-              <a:rPr lang="en-US" sz="800" dirty="0"/>
-              <a:t> </a:t>
-            </a:r>
-            <a:r>
-              <a:rPr lang="en-US" sz="800" dirty="0" smtClean="0"/>
-              <a:t>    </a:t>
-            </a:r>
-            <a:r>
-              <a:rPr lang="en-US" sz="800" dirty="0"/>
-              <a:t>&amp;&amp; White(Color[root[y]])</a:t>
-            </a:r>
-          </a:p>
-          <a:p>
-            <a:r>
-              <a:rPr lang="en-US" sz="800" dirty="0"/>
-              <a:t>   </a:t>
-            </a:r>
-            <a:r>
-              <a:rPr lang="en-US" sz="800" dirty="0" smtClean="0"/>
-              <a:t>  </a:t>
-            </a:r>
-            <a:r>
-              <a:rPr lang="en-US" sz="800" dirty="0"/>
-              <a:t>&amp;&amp; </a:t>
+              <a:rPr lang="en-US" sz="800" dirty="0"/>
+              <a:t>(root[y])</a:t>
+            </a:r>
+          </a:p>
+          <a:p>
+            <a:r>
+              <a:rPr lang="en-US" sz="800" dirty="0"/>
+              <a:t>     &amp;&amp; White(Color[root[y]])</a:t>
+            </a:r>
+          </a:p>
+          <a:p>
+            <a:r>
+              <a:rPr lang="en-US" sz="800" dirty="0"/>
+              <a:t>     &amp;&amp; </a:t>
             </a:r>
             <a:r>
               <a:rPr lang="en-US" sz="800" dirty="0" err="1"/>
@@ -6238,7 +6148,7 @@
           <a:p>
             <a:r>
               <a:rPr lang="en-US" sz="800" dirty="0"/>
-              <a:t>    Color[</a:t>
+              <a:t>                    Color[</a:t>
             </a:r>
             <a:r>
               <a:rPr lang="en-US" sz="800" dirty="0" err="1"/>
@@ -6246,13 +6156,7 @@
             </a:r>
             <a:r>
               <a:rPr lang="en-US" sz="800" dirty="0"/>
-              <a:t>] := GRAY();</a:t>
-            </a:r>
-          </a:p>
-          <a:p>
-            <a:r>
-              <a:rPr lang="en-US" sz="800" dirty="0"/>
-              <a:t>}</a:t>
+              <a:t>] := GRAY();               }</a:t>
             </a:r>
           </a:p>
         </p:txBody>
@@ -6265,26 +6169,28 @@
         </p:nvSpPr>
         <p:spPr>
           <a:xfrm>
-            <a:off x="47784" y="5672252"/>
+            <a:off x="47784" y="5462545"/>
             <a:ext cx="759542" cy="239487"/>
           </a:xfrm>
           <a:prstGeom prst="roundRect">
             <a:avLst/>
           </a:prstGeom>
-          <a:ln w="28575"/>
+          <a:ln/>
         </p:spPr>
         <p:style>
           <a:lnRef idx="2">
-            <a:schemeClr val="accent1"/>
+            <a:schemeClr val="accent1">
+              <a:shade val="50000"/>
+            </a:schemeClr>
           </a:lnRef>
           <a:fillRef idx="1">
-            <a:schemeClr val="lt1"/>
+            <a:schemeClr val="accent1"/>
           </a:fillRef>
           <a:effectRef idx="0">
             <a:schemeClr val="accent1"/>
           </a:effectRef>
           <a:fontRef idx="minor">
-            <a:schemeClr val="dk1"/>
+            <a:schemeClr val="lt1"/>
           </a:fontRef>
         </p:style>
         <p:txBody>
@@ -6300,24 +6206,11 @@
             <a:r>
               <a:rPr lang="en-US" b="1" dirty="0">
                 <a:solidFill>
-                  <a:schemeClr val="accent1"/>
+                  <a:schemeClr val="bg1"/>
                 </a:solidFill>
               </a:rPr>
-              <a:t>phase </a:t>
-            </a:r>
-            <a:r>
-              <a:rPr lang="en-US" b="1" dirty="0" smtClean="0">
-                <a:solidFill>
-                  <a:schemeClr val="accent1"/>
-                </a:solidFill>
-              </a:rPr>
-              <a:t>5</a:t>
-            </a:r>
-            <a:endParaRPr lang="en-US" b="1" dirty="0">
-              <a:solidFill>
-                <a:schemeClr val="accent1"/>
-              </a:solidFill>
-            </a:endParaRPr>
+              <a:t>phase 5</a:t>
+            </a:r>
           </a:p>
         </p:txBody>
       </p:sp>
@@ -6329,7 +6222,7 @@
         </p:nvCxnSpPr>
         <p:spPr>
           <a:xfrm>
-            <a:off x="3994245" y="2092657"/>
+            <a:off x="3994250" y="2065823"/>
             <a:ext cx="20329" cy="1874533"/>
           </a:xfrm>
           <a:prstGeom prst="straightConnector1">
@@ -6362,7 +6255,7 @@
         </p:nvSpPr>
         <p:spPr>
           <a:xfrm>
-            <a:off x="2165561" y="3118274"/>
+            <a:off x="2165566" y="3051685"/>
             <a:ext cx="1768983" cy="584775"/>
           </a:xfrm>
           <a:prstGeom prst="rect">
@@ -6391,19 +6284,19 @@
           <a:lstStyle/>
           <a:p>
             <a:r>
-              <a:rPr lang="en-US" sz="800" b="1" dirty="0" smtClean="0"/>
+              <a:rPr lang="en-US" sz="800" b="1" dirty="0"/>
               <a:t>Sweep</a:t>
             </a:r>
             <a:r>
-              <a:rPr lang="en-US" sz="800" dirty="0" smtClean="0"/>
+              <a:rPr lang="en-US" sz="800" dirty="0"/>
               <a:t>(</a:t>
             </a:r>
             <a:r>
-              <a:rPr lang="en-US" sz="800" dirty="0" err="1" smtClean="0"/>
+              <a:rPr lang="en-US" sz="800" dirty="0" err="1"/>
               <a:t>cnst</a:t>
             </a:r>
             <a:r>
-              <a:rPr lang="en-US" sz="800" dirty="0" smtClean="0"/>
+              <a:rPr lang="en-US" sz="800" dirty="0"/>
               <a:t> </a:t>
             </a:r>
             <a:r>

</xml_diff>

<commit_message>
Minor wording changes to save space
</commit_message>
<xml_diff>
--- a/VerifiedGC.pptx
+++ b/VerifiedGC.pptx
@@ -3933,7 +3933,15 @@
             </a:r>
             <a:r>
               <a:rPr lang="en-US" sz="800" dirty="0"/>
-              <a:t> = y</a:t>
+              <a:t> </a:t>
+            </a:r>
+            <a:r>
+              <a:rPr lang="en-US" sz="800" dirty="0" smtClean="0"/>
+              <a:t>:= </a:t>
+            </a:r>
+            <a:r>
+              <a:rPr lang="en-US" sz="800" dirty="0"/>
+              <a:t>y</a:t>
             </a:r>
           </a:p>
           <a:p>
@@ -4226,7 +4234,11 @@
           <a:p>
             <a:r>
               <a:rPr lang="en-US" sz="800" dirty="0"/>
-              <a:t>// y = </a:t>
+              <a:t>// y </a:t>
+            </a:r>
+            <a:r>
+              <a:rPr lang="en-US" sz="800" dirty="0" smtClean="0"/>
+              <a:t>:= </a:t>
             </a:r>
             <a:r>
               <a:rPr lang="en-US" sz="800" dirty="0" err="1"/>
@@ -4524,11 +4536,7 @@
             </a:r>
             <a:r>
               <a:rPr lang="en-US" sz="800" dirty="0" smtClean="0"/>
-              <a:t>                 </a:t>
-            </a:r>
-            <a:r>
-              <a:rPr lang="en-US" sz="800" dirty="0" smtClean="0"/>
-              <a:t>linear </a:t>
+              <a:t>                 linear </a:t>
             </a:r>
             <a:r>
               <a:rPr lang="en-US" sz="800" dirty="0" err="1"/>
@@ -4607,8 +4615,8 @@
         </p:nvSpPr>
         <p:spPr>
           <a:xfrm>
-            <a:off x="2279469" y="18305"/>
-            <a:ext cx="1321516" cy="338554"/>
+            <a:off x="2110421" y="18305"/>
+            <a:ext cx="1685398" cy="338554"/>
           </a:xfrm>
           <a:prstGeom prst="rect">
             <a:avLst/>
@@ -4648,8 +4656,13 @@
             </a:r>
             <a:r>
               <a:rPr lang="en-US" sz="800" dirty="0"/>
-              <a:t>, x:idx, y:idx)</a:t>
-            </a:r>
+              <a:t>, x:idx, y:idx</a:t>
+            </a:r>
+            <a:r>
+              <a:rPr lang="en-US" sz="800" dirty="0" smtClean="0"/>
+              <a:t>) // x == y</a:t>
+            </a:r>
+            <a:endParaRPr lang="en-US" sz="800" dirty="0"/>
           </a:p>
           <a:p>
             <a:r>

</xml_diff>

<commit_message>
Minor wording and grammar changes to GC section
</commit_message>
<xml_diff>
--- a/VerifiedGC.pptx
+++ b/VerifiedGC.pptx
@@ -243,7 +243,7 @@
           <a:p>
             <a:fld id="{20507B74-BD1D-4910-9354-6C6C7262377A}" type="datetimeFigureOut">
               <a:rPr lang="en-US" smtClean="0"/>
-              <a:t>7/7/2014</a:t>
+              <a:t>7/8/2014</a:t>
             </a:fld>
             <a:endParaRPr lang="en-US"/>
           </a:p>
@@ -413,7 +413,7 @@
           <a:p>
             <a:fld id="{20507B74-BD1D-4910-9354-6C6C7262377A}" type="datetimeFigureOut">
               <a:rPr lang="en-US" smtClean="0"/>
-              <a:t>7/7/2014</a:t>
+              <a:t>7/8/2014</a:t>
             </a:fld>
             <a:endParaRPr lang="en-US"/>
           </a:p>
@@ -593,7 +593,7 @@
           <a:p>
             <a:fld id="{20507B74-BD1D-4910-9354-6C6C7262377A}" type="datetimeFigureOut">
               <a:rPr lang="en-US" smtClean="0"/>
-              <a:t>7/7/2014</a:t>
+              <a:t>7/8/2014</a:t>
             </a:fld>
             <a:endParaRPr lang="en-US"/>
           </a:p>
@@ -763,7 +763,7 @@
           <a:p>
             <a:fld id="{20507B74-BD1D-4910-9354-6C6C7262377A}" type="datetimeFigureOut">
               <a:rPr lang="en-US" smtClean="0"/>
-              <a:t>7/7/2014</a:t>
+              <a:t>7/8/2014</a:t>
             </a:fld>
             <a:endParaRPr lang="en-US"/>
           </a:p>
@@ -1007,7 +1007,7 @@
           <a:p>
             <a:fld id="{20507B74-BD1D-4910-9354-6C6C7262377A}" type="datetimeFigureOut">
               <a:rPr lang="en-US" smtClean="0"/>
-              <a:t>7/7/2014</a:t>
+              <a:t>7/8/2014</a:t>
             </a:fld>
             <a:endParaRPr lang="en-US"/>
           </a:p>
@@ -1239,7 +1239,7 @@
           <a:p>
             <a:fld id="{20507B74-BD1D-4910-9354-6C6C7262377A}" type="datetimeFigureOut">
               <a:rPr lang="en-US" smtClean="0"/>
-              <a:t>7/7/2014</a:t>
+              <a:t>7/8/2014</a:t>
             </a:fld>
             <a:endParaRPr lang="en-US"/>
           </a:p>
@@ -1606,7 +1606,7 @@
           <a:p>
             <a:fld id="{20507B74-BD1D-4910-9354-6C6C7262377A}" type="datetimeFigureOut">
               <a:rPr lang="en-US" smtClean="0"/>
-              <a:t>7/7/2014</a:t>
+              <a:t>7/8/2014</a:t>
             </a:fld>
             <a:endParaRPr lang="en-US"/>
           </a:p>
@@ -1724,7 +1724,7 @@
           <a:p>
             <a:fld id="{20507B74-BD1D-4910-9354-6C6C7262377A}" type="datetimeFigureOut">
               <a:rPr lang="en-US" smtClean="0"/>
-              <a:t>7/7/2014</a:t>
+              <a:t>7/8/2014</a:t>
             </a:fld>
             <a:endParaRPr lang="en-US"/>
           </a:p>
@@ -1819,7 +1819,7 @@
           <a:p>
             <a:fld id="{20507B74-BD1D-4910-9354-6C6C7262377A}" type="datetimeFigureOut">
               <a:rPr lang="en-US" smtClean="0"/>
-              <a:t>7/7/2014</a:t>
+              <a:t>7/8/2014</a:t>
             </a:fld>
             <a:endParaRPr lang="en-US"/>
           </a:p>
@@ -2096,7 +2096,7 @@
           <a:p>
             <a:fld id="{20507B74-BD1D-4910-9354-6C6C7262377A}" type="datetimeFigureOut">
               <a:rPr lang="en-US" smtClean="0"/>
-              <a:t>7/7/2014</a:t>
+              <a:t>7/8/2014</a:t>
             </a:fld>
             <a:endParaRPr lang="en-US"/>
           </a:p>
@@ -2353,7 +2353,7 @@
           <a:p>
             <a:fld id="{20507B74-BD1D-4910-9354-6C6C7262377A}" type="datetimeFigureOut">
               <a:rPr lang="en-US" smtClean="0"/>
-              <a:t>7/7/2014</a:t>
+              <a:t>7/8/2014</a:t>
             </a:fld>
             <a:endParaRPr lang="en-US"/>
           </a:p>
@@ -2566,7 +2566,7 @@
           <a:p>
             <a:fld id="{20507B74-BD1D-4910-9354-6C6C7262377A}" type="datetimeFigureOut">
               <a:rPr lang="en-US" smtClean="0"/>
-              <a:t>7/7/2014</a:t>
+              <a:t>7/8/2014</a:t>
             </a:fld>
             <a:endParaRPr lang="en-US"/>
           </a:p>
@@ -6066,14 +6066,10 @@
           <a:p>
             <a:r>
               <a:rPr lang="en-US" sz="800" dirty="0"/>
-              <a:t>     </a:t>
-            </a:r>
-            <a:r>
-              <a:rPr lang="en-US" sz="800"/>
-              <a:t>&amp;&amp; </a:t>
-            </a:r>
-            <a:r>
-              <a:rPr lang="en-US" sz="800" smtClean="0"/>
+              <a:t>     &amp;&amp; </a:t>
+            </a:r>
+            <a:r>
+              <a:rPr lang="en-US" sz="800" dirty="0" smtClean="0"/>
               <a:t>Color[root[y]] == WHITE</a:t>
             </a:r>
             <a:endParaRPr lang="en-US" sz="800" dirty="0"/>
@@ -6084,28 +6080,24 @@
               <a:t>     &amp;&amp; </a:t>
             </a:r>
             <a:r>
-              <a:rPr lang="en-US" sz="800" dirty="0" err="1"/>
-              <a:t>MarkPhase</a:t>
-            </a:r>
-            <a:r>
-              <a:rPr lang="en-US" sz="800" dirty="0"/>
-              <a:t>(</a:t>
-            </a:r>
-            <a:r>
-              <a:rPr lang="en-US" sz="800" dirty="0" err="1"/>
+              <a:rPr lang="en-US" sz="800" dirty="0" err="1" smtClean="0"/>
               <a:t>mutatorPhase</a:t>
             </a:r>
             <a:r>
-              <a:rPr lang="en-US" sz="800" dirty="0"/>
+              <a:rPr lang="en-US" sz="800" dirty="0" smtClean="0"/>
               <a:t>[</a:t>
             </a:r>
             <a:r>
-              <a:rPr lang="en-US" sz="800" dirty="0" err="1"/>
+              <a:rPr lang="en-US" sz="800" dirty="0" err="1" smtClean="0"/>
               <a:t>tid</a:t>
             </a:r>
             <a:r>
-              <a:rPr lang="en-US" sz="800" dirty="0"/>
-              <a:t>])) {</a:t>
+              <a:rPr lang="en-US" sz="800" dirty="0" smtClean="0"/>
+              <a:t>] == MARK) </a:t>
+            </a:r>
+            <a:r>
+              <a:rPr lang="en-US" sz="800" dirty="0"/>
+              <a:t>{</a:t>
             </a:r>
           </a:p>
           <a:p>

</xml_diff>

<commit_message>
Minor edits to GC section
</commit_message>
<xml_diff>
--- a/VerifiedGC.pptx
+++ b/VerifiedGC.pptx
@@ -2979,8 +2979,8 @@
         </p:nvSpPr>
         <p:spPr>
           <a:xfrm>
-            <a:off x="4052673" y="2192647"/>
-            <a:ext cx="2327539" cy="1446550"/>
+            <a:off x="4016169" y="2192647"/>
+            <a:ext cx="2331780" cy="1446550"/>
           </a:xfrm>
           <a:prstGeom prst="rect">
             <a:avLst/>
@@ -3109,7 +3109,15 @@
             </a:r>
             <a:r>
               <a:rPr lang="en-US" sz="800" dirty="0"/>
-              <a:t>; f := f + 1) {</a:t>
+              <a:t>; </a:t>
+            </a:r>
+            <a:r>
+              <a:rPr lang="en-US" sz="800" dirty="0" smtClean="0"/>
+              <a:t>f++) </a:t>
+            </a:r>
+            <a:r>
+              <a:rPr lang="en-US" sz="800" dirty="0"/>
+              <a:t>{</a:t>
             </a:r>
           </a:p>
           <a:p>
@@ -3134,15 +3142,15 @@
               <a:t> := </a:t>
             </a:r>
             <a:r>
-              <a:rPr lang="en-US" sz="800" dirty="0" err="1"/>
-              <a:t>ReadFieldC</a:t>
-            </a:r>
-            <a:r>
-              <a:rPr lang="en-US" sz="800" dirty="0"/>
+              <a:rPr lang="en-US" sz="800" dirty="0" err="1" smtClean="0"/>
+              <a:t>ReadFieldInMark</a:t>
+            </a:r>
+            <a:r>
+              <a:rPr lang="en-US" sz="800" dirty="0" smtClean="0"/>
               <a:t>(</a:t>
             </a:r>
             <a:r>
-              <a:rPr lang="en-US" sz="800" dirty="0" err="1"/>
+              <a:rPr lang="en-US" sz="800" dirty="0" err="1" smtClean="0"/>
               <a:t>tid</a:t>
             </a:r>
             <a:r>
@@ -3167,18 +3175,26 @@
           <a:p>
             <a:r>
               <a:rPr lang="en-US" sz="800" dirty="0"/>
-              <a:t>                call </a:t>
-            </a:r>
-            <a:r>
-              <a:rPr lang="en-US" sz="800" dirty="0" err="1"/>
-              <a:t>GraySetInsert</a:t>
-            </a:r>
-            <a:r>
-              <a:rPr lang="en-US" sz="800" dirty="0"/>
+              <a:t>   </a:t>
+            </a:r>
+            <a:r>
+              <a:rPr lang="en-US" sz="800" dirty="0" smtClean="0"/>
+              <a:t>            </a:t>
+            </a:r>
+            <a:r>
+              <a:rPr lang="en-US" sz="800" dirty="0"/>
+              <a:t>call </a:t>
+            </a:r>
+            <a:r>
+              <a:rPr lang="en-US" sz="800" dirty="0" err="1" smtClean="0"/>
+              <a:t>GraySetInsertChildIfWhite</a:t>
+            </a:r>
+            <a:r>
+              <a:rPr lang="en-US" sz="800" dirty="0" smtClean="0"/>
               <a:t>(</a:t>
             </a:r>
             <a:r>
-              <a:rPr lang="en-US" sz="800" dirty="0" err="1"/>
+              <a:rPr lang="en-US" sz="800" dirty="0" err="1" smtClean="0"/>
               <a:t>tid</a:t>
             </a:r>
             <a:r>
@@ -3790,20 +3806,24 @@
               <a:t>(y) &amp;&amp; </a:t>
             </a:r>
             <a:r>
-              <a:rPr lang="en-US" sz="800" dirty="0" err="1"/>
+              <a:rPr lang="en-US" sz="800" dirty="0" err="1" smtClean="0"/>
               <a:t>tidOwns</a:t>
             </a:r>
             <a:r>
-              <a:rPr lang="en-US" sz="800" dirty="0"/>
+              <a:rPr lang="en-US" sz="800" dirty="0" smtClean="0"/>
               <a:t>(</a:t>
             </a:r>
             <a:r>
-              <a:rPr lang="en-US" sz="800" dirty="0" err="1"/>
-              <a:t>tid</a:t>
-            </a:r>
-            <a:r>
-              <a:rPr lang="en-US" sz="800" dirty="0"/>
-              <a:t>, y);</a:t>
+              <a:rPr lang="en-US" sz="800" dirty="0" err="1" smtClean="0"/>
+              <a:t>tid_in</a:t>
+            </a:r>
+            <a:r>
+              <a:rPr lang="en-US" sz="800" dirty="0" smtClean="0"/>
+              <a:t>, </a:t>
+            </a:r>
+            <a:r>
+              <a:rPr lang="en-US" sz="800" dirty="0"/>
+              <a:t>y);</a:t>
             </a:r>
           </a:p>
           <a:p>
@@ -6185,7 +6205,7 @@
         </p:nvCxnSpPr>
         <p:spPr>
           <a:xfrm>
-            <a:off x="3994250" y="2065823"/>
+            <a:off x="3976518" y="2065823"/>
             <a:ext cx="20329" cy="1874533"/>
           </a:xfrm>
           <a:prstGeom prst="straightConnector1">

</xml_diff>